<commit_message>
Changes API calls to Notehub projects to use product UID
Product UID is a more accessible value, and can be discerned from either
the Notecard, or Notehub.  It is also user-defined, which means the
user is already familiar with this ID.
</commit_message>
<xml_diff>
--- a/Host Firmware Tutorial.pptx
+++ b/Host Firmware Tutorial.pptx
@@ -215,6 +215,18 @@
 </p:presentation>
 </file>
 
+<file path=ppt/commentAuthors.xml><?xml version="1.0" encoding="utf-8"?>
+<p:cmAuthorLst xmlns:a="http://schemas.openxmlformats.org/drawingml/2006/main" xmlns:r="http://schemas.openxmlformats.org/officeDocument/2006/relationships" xmlns:p="http://schemas.openxmlformats.org/presentationml/2006/main">
+  <p:cmAuthor id="1" name="Greg Wolff" initials="GW" lastIdx="1" clrIdx="0">
+    <p:extLst>
+      <p:ext uri="{19B8F6BF-5375-455C-9EA6-DF929625EA0E}">
+        <p15:presenceInfo xmlns:p15="http://schemas.microsoft.com/office/powerpoint/2012/main" userId="6e84d171ddb409c4" providerId="Windows Live"/>
+      </p:ext>
+    </p:extLst>
+  </p:cmAuthor>
+</p:cmAuthorLst>
+</file>
+
 <file path=ppt/slideLayouts/slideLayout1.xml><?xml version="1.0" encoding="utf-8"?>
 <p:sldLayout xmlns:a="http://schemas.openxmlformats.org/drawingml/2006/main" xmlns:r="http://schemas.openxmlformats.org/officeDocument/2006/relationships" xmlns:p="http://schemas.openxmlformats.org/presentationml/2006/main" type="title" preserve="1">
   <p:cSld name="Title Slide">
@@ -362,7 +374,7 @@
           <a:p>
             <a:fld id="{33BEA90A-ED50-48F3-8DBA-1EEEB5B38D46}" type="datetimeFigureOut">
               <a:rPr lang="en-US" smtClean="0"/>
-              <a:t>3/16/2020</a:t>
+              <a:t>3/17/2020</a:t>
             </a:fld>
             <a:endParaRPr lang="en-US"/>
           </a:p>
@@ -560,7 +572,7 @@
           <a:p>
             <a:fld id="{33BEA90A-ED50-48F3-8DBA-1EEEB5B38D46}" type="datetimeFigureOut">
               <a:rPr lang="en-US" smtClean="0"/>
-              <a:t>3/16/2020</a:t>
+              <a:t>3/17/2020</a:t>
             </a:fld>
             <a:endParaRPr lang="en-US"/>
           </a:p>
@@ -768,7 +780,7 @@
           <a:p>
             <a:fld id="{33BEA90A-ED50-48F3-8DBA-1EEEB5B38D46}" type="datetimeFigureOut">
               <a:rPr lang="en-US" smtClean="0"/>
-              <a:t>3/16/2020</a:t>
+              <a:t>3/17/2020</a:t>
             </a:fld>
             <a:endParaRPr lang="en-US"/>
           </a:p>
@@ -966,7 +978,7 @@
           <a:p>
             <a:fld id="{33BEA90A-ED50-48F3-8DBA-1EEEB5B38D46}" type="datetimeFigureOut">
               <a:rPr lang="en-US" smtClean="0"/>
-              <a:t>3/16/2020</a:t>
+              <a:t>3/17/2020</a:t>
             </a:fld>
             <a:endParaRPr lang="en-US"/>
           </a:p>
@@ -1241,7 +1253,7 @@
           <a:p>
             <a:fld id="{33BEA90A-ED50-48F3-8DBA-1EEEB5B38D46}" type="datetimeFigureOut">
               <a:rPr lang="en-US" smtClean="0"/>
-              <a:t>3/16/2020</a:t>
+              <a:t>3/17/2020</a:t>
             </a:fld>
             <a:endParaRPr lang="en-US"/>
           </a:p>
@@ -1506,7 +1518,7 @@
           <a:p>
             <a:fld id="{33BEA90A-ED50-48F3-8DBA-1EEEB5B38D46}" type="datetimeFigureOut">
               <a:rPr lang="en-US" smtClean="0"/>
-              <a:t>3/16/2020</a:t>
+              <a:t>3/17/2020</a:t>
             </a:fld>
             <a:endParaRPr lang="en-US"/>
           </a:p>
@@ -1918,7 +1930,7 @@
           <a:p>
             <a:fld id="{33BEA90A-ED50-48F3-8DBA-1EEEB5B38D46}" type="datetimeFigureOut">
               <a:rPr lang="en-US" smtClean="0"/>
-              <a:t>3/16/2020</a:t>
+              <a:t>3/17/2020</a:t>
             </a:fld>
             <a:endParaRPr lang="en-US"/>
           </a:p>
@@ -2059,7 +2071,7 @@
           <a:p>
             <a:fld id="{33BEA90A-ED50-48F3-8DBA-1EEEB5B38D46}" type="datetimeFigureOut">
               <a:rPr lang="en-US" smtClean="0"/>
-              <a:t>3/16/2020</a:t>
+              <a:t>3/17/2020</a:t>
             </a:fld>
             <a:endParaRPr lang="en-US"/>
           </a:p>
@@ -2172,7 +2184,7 @@
           <a:p>
             <a:fld id="{33BEA90A-ED50-48F3-8DBA-1EEEB5B38D46}" type="datetimeFigureOut">
               <a:rPr lang="en-US" smtClean="0"/>
-              <a:t>3/16/2020</a:t>
+              <a:t>3/17/2020</a:t>
             </a:fld>
             <a:endParaRPr lang="en-US"/>
           </a:p>
@@ -2483,7 +2495,7 @@
           <a:p>
             <a:fld id="{33BEA90A-ED50-48F3-8DBA-1EEEB5B38D46}" type="datetimeFigureOut">
               <a:rPr lang="en-US" smtClean="0"/>
-              <a:t>3/16/2020</a:t>
+              <a:t>3/17/2020</a:t>
             </a:fld>
             <a:endParaRPr lang="en-US"/>
           </a:p>
@@ -2771,7 +2783,7 @@
           <a:p>
             <a:fld id="{33BEA90A-ED50-48F3-8DBA-1EEEB5B38D46}" type="datetimeFigureOut">
               <a:rPr lang="en-US" smtClean="0"/>
-              <a:t>3/16/2020</a:t>
+              <a:t>3/17/2020</a:t>
             </a:fld>
             <a:endParaRPr lang="en-US"/>
           </a:p>
@@ -3012,7 +3024,7 @@
           <a:p>
             <a:fld id="{33BEA90A-ED50-48F3-8DBA-1EEEB5B38D46}" type="datetimeFigureOut">
               <a:rPr lang="en-US" smtClean="0"/>
-              <a:t>3/16/2020</a:t>
+              <a:t>3/17/2020</a:t>
             </a:fld>
             <a:endParaRPr lang="en-US"/>
           </a:p>
@@ -10677,7 +10689,7 @@
             </a:r>
             <a:r>
               <a:rPr lang="en-US" dirty="0" err="1"/>
-              <a:t>app_id</a:t>
+              <a:t>product_id</a:t>
             </a:r>
             <a:r>
               <a:rPr lang="en-US" dirty="0"/>
@@ -10739,14 +10751,14 @@
             <p:ph idx="1"/>
             <p:extLst>
               <p:ext uri="{D42A27DB-BD31-4B8C-83A1-F6EECF244321}">
-                <p14:modId xmlns:p14="http://schemas.microsoft.com/office/powerpoint/2010/main" val="3320378837"/>
+                <p14:modId xmlns:p14="http://schemas.microsoft.com/office/powerpoint/2010/main" val="4076468353"/>
               </p:ext>
             </p:extLst>
           </p:nvPr>
         </p:nvGraphicFramePr>
         <p:xfrm>
           <a:off x="5183188" y="987425"/>
-          <a:ext cx="6172200" cy="1112520"/>
+          <a:ext cx="6172200" cy="1168400"/>
         </p:xfrm>
         <a:graphic>
           <a:graphicData uri="http://schemas.openxmlformats.org/drawingml/2006/table">
@@ -10762,14 +10774,14 @@
                     </a:ext>
                   </a:extLst>
                 </a:gridCol>
-                <a:gridCol w="2080592">
+                <a:gridCol w="2383183">
                   <a:extLst>
                     <a:ext uri="{9D8B030D-6E8A-4147-A177-3AD203B41FA5}">
                       <a16:colId xmlns:a16="http://schemas.microsoft.com/office/drawing/2014/main" val="1529368550"/>
                     </a:ext>
                   </a:extLst>
                 </a:gridCol>
-                <a:gridCol w="2971179">
+                <a:gridCol w="2668588">
                   <a:extLst>
                     <a:ext uri="{9D8B030D-6E8A-4147-A177-3AD203B41FA5}">
                       <a16:colId xmlns:a16="http://schemas.microsoft.com/office/drawing/2014/main" val="1662634098"/>
@@ -10832,7 +10844,7 @@
                       </a:r>
                       <a:r>
                         <a:rPr lang="en-US" sz="1100" dirty="0" err="1"/>
-                        <a:t>app_uid</a:t>
+                        <a:t>product_uid</a:t>
                       </a:r>
                       <a:r>
                         <a:rPr lang="en-US" sz="1100" dirty="0"/>
@@ -10849,7 +10861,15 @@
                     <a:p>
                       <a:r>
                         <a:rPr lang="en-US" sz="1100" dirty="0"/>
-                        <a:t>App UID</a:t>
+                        <a:t>Product UID identifies which </a:t>
+                      </a:r>
+                      <a:r>
+                        <a:rPr lang="en-US" sz="1100" dirty="0" err="1"/>
+                        <a:t>Notehub</a:t>
+                      </a:r>
+                      <a:r>
+                        <a:rPr lang="en-US" sz="1100" dirty="0"/>
+                        <a:t> project to append a notefile</a:t>
                       </a:r>
                     </a:p>
                   </a:txBody>
@@ -10861,8 +10881,10 @@
                     <a:lstStyle/>
                     <a:p>
                       <a:r>
-                        <a:rPr lang="en-US" sz="900" dirty="0"/>
-                        <a:t>app:d8edc5cc-c7d7-48ef-aeda-7147b884111a</a:t>
+                        <a:rPr lang="en-US" sz="900" dirty="0" err="1">
+                          <a:latin typeface="Consolas" panose="020B0609020204030204" pitchFamily="49" charset="0"/>
+                        </a:rPr>
+                        <a:t>my_default_project_id</a:t>
                       </a:r>
                       <a:endParaRPr lang="en-US" sz="900" dirty="0">
                         <a:latin typeface="Consolas" panose="020B0609020204030204" pitchFamily="49" charset="0"/>
@@ -11006,7 +11028,7 @@
               <a:rPr lang="en-US" sz="900" dirty="0" err="1">
                 <a:latin typeface="Consolas" panose="020B0609020204030204" pitchFamily="49" charset="0"/>
               </a:rPr>
-              <a:t>req?project</a:t>
+              <a:t>req?product</a:t>
             </a:r>
             <a:r>
               <a:rPr lang="en-US" sz="900" dirty="0">
@@ -11024,7 +11046,7 @@
               <a:rPr lang="en-US" sz="900" b="1" dirty="0" err="1">
                 <a:latin typeface="Consolas" panose="020B0609020204030204" pitchFamily="49" charset="0"/>
               </a:rPr>
-              <a:t>app_uid</a:t>
+              <a:t>product_uid</a:t>
             </a:r>
             <a:r>
               <a:rPr lang="en-US" sz="900" b="1" dirty="0">
@@ -11152,7 +11174,7 @@
               <a:rPr lang="en-US" sz="900" dirty="0" err="1">
                 <a:latin typeface="Consolas" panose="020B0609020204030204" pitchFamily="49" charset="0"/>
               </a:rPr>
-              <a:t>req?project</a:t>
+              <a:t>req?product</a:t>
             </a:r>
             <a:r>
               <a:rPr lang="en-US" sz="900" dirty="0">
@@ -11170,7 +11192,7 @@
               <a:rPr lang="en-US" sz="900" b="1" dirty="0" err="1">
                 <a:latin typeface="Consolas" panose="020B0609020204030204" pitchFamily="49" charset="0"/>
               </a:rPr>
-              <a:t>app_uid</a:t>
+              <a:t>product_uid</a:t>
             </a:r>
             <a:r>
               <a:rPr lang="en-US" sz="900" b="1" dirty="0">
@@ -12560,7 +12582,7 @@
           <a:p>
             <a:r>
               <a:rPr lang="en-US" dirty="0"/>
-              <a:t>Get App UID</a:t>
+              <a:t>Get Product UID</a:t>
             </a:r>
           </a:p>
           <a:p>
@@ -12656,127 +12678,12 @@
           <a:chExt cx="0" cy="0"/>
         </a:xfrm>
       </p:grpSpPr>
-      <p:sp>
-        <p:nvSpPr>
-          <p:cNvPr id="4" name="Title 3">
-            <a:extLst>
-              <a:ext uri="{FF2B5EF4-FFF2-40B4-BE49-F238E27FC236}">
-                <a16:creationId xmlns:a16="http://schemas.microsoft.com/office/drawing/2014/main" id="{5FF723F9-A261-464E-8F90-5808671D53F3}"/>
-              </a:ext>
-            </a:extLst>
-          </p:cNvPr>
-          <p:cNvSpPr>
-            <a:spLocks noGrp="1"/>
-          </p:cNvSpPr>
-          <p:nvPr>
-            <p:ph type="title"/>
-          </p:nvPr>
-        </p:nvSpPr>
-        <p:spPr/>
-        <p:txBody>
-          <a:bodyPr/>
-          <a:lstStyle/>
-          <a:p>
-            <a:r>
-              <a:rPr lang="en-US" dirty="0"/>
-              <a:t>Get App UID</a:t>
-            </a:r>
-          </a:p>
-        </p:txBody>
-      </p:sp>
-      <p:sp>
-        <p:nvSpPr>
-          <p:cNvPr id="6" name="Text Placeholder 5">
-            <a:extLst>
-              <a:ext uri="{FF2B5EF4-FFF2-40B4-BE49-F238E27FC236}">
-                <a16:creationId xmlns:a16="http://schemas.microsoft.com/office/drawing/2014/main" id="{45E49C6F-29E5-4381-9497-6FBCFC64D748}"/>
-              </a:ext>
-            </a:extLst>
-          </p:cNvPr>
-          <p:cNvSpPr>
-            <a:spLocks noGrp="1"/>
-          </p:cNvSpPr>
-          <p:nvPr>
-            <p:ph type="body" sz="half" idx="2"/>
-          </p:nvPr>
-        </p:nvSpPr>
-        <p:spPr/>
-        <p:txBody>
-          <a:bodyPr/>
-          <a:lstStyle/>
-          <a:p>
-            <a:endParaRPr lang="en-US" dirty="0"/>
-          </a:p>
-          <a:p>
-            <a:pPr marL="342900" indent="-342900">
-              <a:buAutoNum type="arabicPeriod"/>
-            </a:pPr>
-            <a:r>
-              <a:rPr lang="en-US" dirty="0"/>
-              <a:t>Navigate to </a:t>
-            </a:r>
-            <a:r>
-              <a:rPr lang="en-US" dirty="0">
-                <a:hlinkClick r:id="rId2"/>
-              </a:rPr>
-              <a:t>https://notehub.io/projects</a:t>
-            </a:r>
-            <a:endParaRPr lang="en-US" dirty="0"/>
-          </a:p>
-          <a:p>
-            <a:pPr marL="342900" indent="-342900">
-              <a:buAutoNum type="arabicPeriod"/>
-            </a:pPr>
-            <a:r>
-              <a:rPr lang="en-US" dirty="0"/>
-              <a:t>Select a Project</a:t>
-            </a:r>
-          </a:p>
-          <a:p>
-            <a:pPr lvl="1"/>
-            <a:r>
-              <a:rPr lang="en-US" dirty="0"/>
-              <a:t>e.g.: My Project</a:t>
-            </a:r>
-          </a:p>
-          <a:p>
-            <a:pPr marL="342900" indent="-342900">
-              <a:buAutoNum type="arabicPeriod"/>
-            </a:pPr>
-            <a:r>
-              <a:rPr lang="en-US" dirty="0"/>
-              <a:t>Click “Project” under “Settings” header on navigation tree</a:t>
-            </a:r>
-          </a:p>
-          <a:p>
-            <a:pPr marL="342900" indent="-342900">
-              <a:buAutoNum type="arabicPeriod"/>
-            </a:pPr>
-            <a:r>
-              <a:rPr lang="en-US" dirty="0"/>
-              <a:t>Hover mouse over right side of App UID field</a:t>
-            </a:r>
-          </a:p>
-          <a:p>
-            <a:pPr marL="342900" indent="-342900">
-              <a:buAutoNum type="arabicPeriod"/>
-            </a:pPr>
-            <a:r>
-              <a:rPr lang="en-US" dirty="0"/>
-              <a:t>Click      to copy App UID to clipboard</a:t>
-            </a:r>
-          </a:p>
-          <a:p>
-            <a:endParaRPr lang="en-US" dirty="0"/>
-          </a:p>
-        </p:txBody>
-      </p:sp>
       <p:pic>
         <p:nvPicPr>
-          <p:cNvPr id="25" name="Content Placeholder 24">
-            <a:extLst>
-              <a:ext uri="{FF2B5EF4-FFF2-40B4-BE49-F238E27FC236}">
-                <a16:creationId xmlns:a16="http://schemas.microsoft.com/office/drawing/2014/main" id="{2F3448F0-0859-4D4E-BEC6-FEB11AC56342}"/>
+          <p:cNvPr id="9" name="Content Placeholder 8">
+            <a:extLst>
+              <a:ext uri="{FF2B5EF4-FFF2-40B4-BE49-F238E27FC236}">
+                <a16:creationId xmlns:a16="http://schemas.microsoft.com/office/drawing/2014/main" id="{B86A7B44-942C-4735-867B-5B4B00845DD1}"/>
               </a:ext>
             </a:extLst>
           </p:cNvPr>
@@ -12787,15 +12694,16 @@
             <p:ph idx="1"/>
           </p:nvPr>
         </p:nvPicPr>
-        <p:blipFill rotWithShape="1">
-          <a:blip r:embed="rId3"/>
-          <a:srcRect t="20592" r="2053" b="15038"/>
-          <a:stretch/>
+        <p:blipFill>
+          <a:blip r:embed="rId2"/>
+          <a:stretch>
+            <a:fillRect/>
+          </a:stretch>
         </p:blipFill>
         <p:spPr>
           <a:xfrm>
-            <a:off x="5180012" y="1257300"/>
-            <a:ext cx="6172200" cy="2660192"/>
+            <a:off x="5183188" y="1270874"/>
+            <a:ext cx="6172200" cy="2713216"/>
           </a:xfrm>
           <a:prstGeom prst="rect">
             <a:avLst/>
@@ -12814,6 +12722,157 @@
       </p:pic>
       <p:sp>
         <p:nvSpPr>
+          <p:cNvPr id="4" name="Title 3">
+            <a:extLst>
+              <a:ext uri="{FF2B5EF4-FFF2-40B4-BE49-F238E27FC236}">
+                <a16:creationId xmlns:a16="http://schemas.microsoft.com/office/drawing/2014/main" id="{5FF723F9-A261-464E-8F90-5808671D53F3}"/>
+              </a:ext>
+            </a:extLst>
+          </p:cNvPr>
+          <p:cNvSpPr>
+            <a:spLocks noGrp="1"/>
+          </p:cNvSpPr>
+          <p:nvPr>
+            <p:ph type="title"/>
+          </p:nvPr>
+        </p:nvSpPr>
+        <p:spPr/>
+        <p:txBody>
+          <a:bodyPr/>
+          <a:lstStyle/>
+          <a:p>
+            <a:r>
+              <a:rPr lang="en-US" dirty="0"/>
+              <a:t>Get Product UID</a:t>
+            </a:r>
+          </a:p>
+        </p:txBody>
+      </p:sp>
+      <p:sp>
+        <p:nvSpPr>
+          <p:cNvPr id="6" name="Text Placeholder 5">
+            <a:extLst>
+              <a:ext uri="{FF2B5EF4-FFF2-40B4-BE49-F238E27FC236}">
+                <a16:creationId xmlns:a16="http://schemas.microsoft.com/office/drawing/2014/main" id="{45E49C6F-29E5-4381-9497-6FBCFC64D748}"/>
+              </a:ext>
+            </a:extLst>
+          </p:cNvPr>
+          <p:cNvSpPr>
+            <a:spLocks noGrp="1"/>
+          </p:cNvSpPr>
+          <p:nvPr>
+            <p:ph type="body" sz="half" idx="2"/>
+          </p:nvPr>
+        </p:nvSpPr>
+        <p:spPr/>
+        <p:txBody>
+          <a:bodyPr/>
+          <a:lstStyle/>
+          <a:p>
+            <a:endParaRPr lang="en-US" dirty="0"/>
+          </a:p>
+          <a:p>
+            <a:pPr marL="342900" indent="-342900">
+              <a:buAutoNum type="arabicPeriod"/>
+            </a:pPr>
+            <a:r>
+              <a:rPr lang="en-US" dirty="0"/>
+              <a:t>Navigate to </a:t>
+            </a:r>
+            <a:r>
+              <a:rPr lang="en-US" dirty="0">
+                <a:hlinkClick r:id="rId3"/>
+              </a:rPr>
+              <a:t>https://notehub.io/projects</a:t>
+            </a:r>
+            <a:endParaRPr lang="en-US" dirty="0"/>
+          </a:p>
+          <a:p>
+            <a:pPr marL="342900" indent="-342900">
+              <a:buAutoNum type="arabicPeriod"/>
+            </a:pPr>
+            <a:r>
+              <a:rPr lang="en-US" dirty="0"/>
+              <a:t>Select a Project</a:t>
+            </a:r>
+          </a:p>
+          <a:p>
+            <a:pPr lvl="1"/>
+            <a:r>
+              <a:rPr lang="en-US" dirty="0"/>
+              <a:t>e.g.: My Project</a:t>
+            </a:r>
+          </a:p>
+          <a:p>
+            <a:pPr marL="342900" indent="-342900">
+              <a:buAutoNum type="arabicPeriod"/>
+            </a:pPr>
+            <a:r>
+              <a:rPr lang="en-US" dirty="0"/>
+              <a:t>Click “Project” under “Settings” header on navigation tree</a:t>
+            </a:r>
+          </a:p>
+          <a:p>
+            <a:pPr marL="342900" indent="-342900">
+              <a:buAutoNum type="arabicPeriod"/>
+            </a:pPr>
+            <a:r>
+              <a:rPr lang="en-US" dirty="0"/>
+              <a:t>Highlight and copy a UID from the available Product UIDs table</a:t>
+            </a:r>
+          </a:p>
+          <a:p>
+            <a:endParaRPr lang="en-US" dirty="0"/>
+          </a:p>
+        </p:txBody>
+      </p:sp>
+      <p:pic>
+        <p:nvPicPr>
+          <p:cNvPr id="1026" name="Picture 2">
+            <a:extLst>
+              <a:ext uri="{FF2B5EF4-FFF2-40B4-BE49-F238E27FC236}">
+                <a16:creationId xmlns:a16="http://schemas.microsoft.com/office/drawing/2014/main" id="{8BF78565-495B-4D33-88FD-50136E23F918}"/>
+              </a:ext>
+            </a:extLst>
+          </p:cNvPr>
+          <p:cNvPicPr>
+            <a:picLocks noChangeAspect="1" noChangeArrowheads="1"/>
+          </p:cNvPicPr>
+          <p:nvPr/>
+        </p:nvPicPr>
+        <p:blipFill rotWithShape="1">
+          <a:blip r:embed="rId4">
+            <a:extLst>
+              <a:ext uri="{28A0092B-C50C-407E-A947-70E740481C1C}">
+                <a14:useLocalDpi xmlns:a14="http://schemas.microsoft.com/office/drawing/2010/main" val="0"/>
+              </a:ext>
+            </a:extLst>
+          </a:blip>
+          <a:srcRect l="45916" t="10075" b="8815"/>
+          <a:stretch/>
+        </p:blipFill>
+        <p:spPr bwMode="auto">
+          <a:xfrm>
+            <a:off x="2016981" y="504596"/>
+            <a:ext cx="160849" cy="181204"/>
+          </a:xfrm>
+          <a:prstGeom prst="rect">
+            <a:avLst/>
+          </a:prstGeom>
+          <a:noFill/>
+          <a:extLst>
+            <a:ext uri="{909E8E84-426E-40DD-AFC4-6F175D3DCCD1}">
+              <a14:hiddenFill xmlns:a14="http://schemas.microsoft.com/office/drawing/2010/main">
+                <a:solidFill>
+                  <a:srgbClr val="FFFFFF"/>
+                </a:solidFill>
+              </a14:hiddenFill>
+            </a:ext>
+          </a:extLst>
+        </p:spPr>
+      </p:pic>
+      <p:sp>
+        <p:nvSpPr>
           <p:cNvPr id="27" name="Oval 26">
             <a:extLst>
               <a:ext uri="{FF2B5EF4-FFF2-40B4-BE49-F238E27FC236}">
@@ -12826,7 +12885,7 @@
         </p:nvSpPr>
         <p:spPr>
           <a:xfrm>
-            <a:off x="5958840" y="3154680"/>
+            <a:off x="5958840" y="3200266"/>
             <a:ext cx="274320" cy="274320"/>
           </a:xfrm>
           <a:prstGeom prst="ellipse">
@@ -12875,7 +12934,7 @@
         </p:nvSpPr>
         <p:spPr>
           <a:xfrm>
-            <a:off x="10835861" y="2587396"/>
+            <a:off x="8405725" y="3573975"/>
             <a:ext cx="274320" cy="274320"/>
           </a:xfrm>
           <a:prstGeom prst="ellipse">
@@ -12910,90 +12969,6 @@
           </a:p>
         </p:txBody>
       </p:sp>
-      <p:pic>
-        <p:nvPicPr>
-          <p:cNvPr id="1026" name="Picture 2">
-            <a:extLst>
-              <a:ext uri="{FF2B5EF4-FFF2-40B4-BE49-F238E27FC236}">
-                <a16:creationId xmlns:a16="http://schemas.microsoft.com/office/drawing/2014/main" id="{8BF78565-495B-4D33-88FD-50136E23F918}"/>
-              </a:ext>
-            </a:extLst>
-          </p:cNvPr>
-          <p:cNvPicPr>
-            <a:picLocks noChangeAspect="1" noChangeArrowheads="1"/>
-          </p:cNvPicPr>
-          <p:nvPr/>
-        </p:nvPicPr>
-        <p:blipFill rotWithShape="1">
-          <a:blip r:embed="rId4">
-            <a:extLst>
-              <a:ext uri="{28A0092B-C50C-407E-A947-70E740481C1C}">
-                <a14:useLocalDpi xmlns:a14="http://schemas.microsoft.com/office/drawing/2010/main" val="0"/>
-              </a:ext>
-            </a:extLst>
-          </a:blip>
-          <a:srcRect l="45916" t="10075" b="8815"/>
-          <a:stretch/>
-        </p:blipFill>
-        <p:spPr bwMode="auto">
-          <a:xfrm>
-            <a:off x="11110181" y="2551836"/>
-            <a:ext cx="160849" cy="181204"/>
-          </a:xfrm>
-          <a:prstGeom prst="rect">
-            <a:avLst/>
-          </a:prstGeom>
-          <a:noFill/>
-          <a:extLst>
-            <a:ext uri="{909E8E84-426E-40DD-AFC4-6F175D3DCCD1}">
-              <a14:hiddenFill xmlns:a14="http://schemas.microsoft.com/office/drawing/2010/main">
-                <a:solidFill>
-                  <a:srgbClr val="FFFFFF"/>
-                </a:solidFill>
-              </a14:hiddenFill>
-            </a:ext>
-          </a:extLst>
-        </p:spPr>
-      </p:pic>
-      <p:pic>
-        <p:nvPicPr>
-          <p:cNvPr id="35" name="Graphic 34" descr="Paperclip">
-            <a:extLst>
-              <a:ext uri="{FF2B5EF4-FFF2-40B4-BE49-F238E27FC236}">
-                <a16:creationId xmlns:a16="http://schemas.microsoft.com/office/drawing/2014/main" id="{FAE7C0E3-D40A-4593-8528-4B9550379DDD}"/>
-              </a:ext>
-            </a:extLst>
-          </p:cNvPr>
-          <p:cNvPicPr>
-            <a:picLocks noChangeAspect="1"/>
-          </p:cNvPicPr>
-          <p:nvPr/>
-        </p:nvPicPr>
-        <p:blipFill>
-          <a:blip r:embed="rId5">
-            <a:extLst>
-              <a:ext uri="{28A0092B-C50C-407E-A947-70E740481C1C}">
-                <a14:useLocalDpi xmlns:a14="http://schemas.microsoft.com/office/drawing/2010/main" val="0"/>
-              </a:ext>
-              <a:ext uri="{96DAC541-7B7A-43D3-8B79-37D633B846F1}">
-                <asvg:svgBlip xmlns:asvg="http://schemas.microsoft.com/office/drawing/2016/SVG/main" r:embed="rId6"/>
-              </a:ext>
-            </a:extLst>
-          </a:blip>
-          <a:stretch>
-            <a:fillRect/>
-          </a:stretch>
-        </p:blipFill>
-        <p:spPr>
-          <a:xfrm>
-            <a:off x="1662486" y="4524203"/>
-            <a:ext cx="243840" cy="243840"/>
-          </a:xfrm>
-          <a:prstGeom prst="rect">
-            <a:avLst/>
-          </a:prstGeom>
-        </p:spPr>
-      </p:pic>
     </p:spTree>
     <p:extLst>
       <p:ext uri="{BB962C8B-B14F-4D97-AF65-F5344CB8AC3E}">
@@ -13184,7 +13159,7 @@
             </a:pPr>
             <a:r>
               <a:rPr lang="en-US" dirty="0"/>
-              <a:t>Click      to copy App UID to clipboard</a:t>
+              <a:t>Click      to copy Device UID to clipboard</a:t>
             </a:r>
           </a:p>
           <a:p>
@@ -13846,7 +13821,10 @@
             <a:pPr marL="342900" indent="-342900">
               <a:buAutoNum type="arabicPeriod"/>
             </a:pPr>
-            <a:endParaRPr lang="en-US" dirty="0"/>
+            <a:r>
+              <a:rPr lang="en-US" dirty="0"/>
+              <a:t>Press CTRL-C to exit interactive mode</a:t>
+            </a:r>
           </a:p>
           <a:p>
             <a:pPr marL="342900" indent="-342900">
@@ -14161,7 +14139,7 @@
             </a:r>
             <a:r>
               <a:rPr lang="en-US" dirty="0"/>
-              <a:t>&gt; in the command with your specific, app </a:t>
+              <a:t>&gt; in the command with your specific, product </a:t>
             </a:r>
             <a:r>
               <a:rPr lang="en-US" dirty="0" err="1"/>
@@ -14218,7 +14196,7 @@
             <p:ph idx="1"/>
             <p:extLst>
               <p:ext uri="{D42A27DB-BD31-4B8C-83A1-F6EECF244321}">
-                <p14:modId xmlns:p14="http://schemas.microsoft.com/office/powerpoint/2010/main" val="264568411"/>
+                <p14:modId xmlns:p14="http://schemas.microsoft.com/office/powerpoint/2010/main" val="4018759279"/>
               </p:ext>
             </p:extLst>
           </p:nvPr>
@@ -14241,14 +14219,14 @@
                     </a:ext>
                   </a:extLst>
                 </a:gridCol>
-                <a:gridCol w="2080592">
+                <a:gridCol w="2373947">
                   <a:extLst>
                     <a:ext uri="{9D8B030D-6E8A-4147-A177-3AD203B41FA5}">
                       <a16:colId xmlns:a16="http://schemas.microsoft.com/office/drawing/2014/main" val="1529368550"/>
                     </a:ext>
                   </a:extLst>
                 </a:gridCol>
-                <a:gridCol w="2971179">
+                <a:gridCol w="2677824">
                   <a:extLst>
                     <a:ext uri="{9D8B030D-6E8A-4147-A177-3AD203B41FA5}">
                       <a16:colId xmlns:a16="http://schemas.microsoft.com/office/drawing/2014/main" val="1662634098"/>
@@ -14311,7 +14289,7 @@
                       </a:r>
                       <a:r>
                         <a:rPr lang="en-US" sz="1100" dirty="0" err="1"/>
-                        <a:t>app_uid</a:t>
+                        <a:t>product_uid</a:t>
                       </a:r>
                       <a:r>
                         <a:rPr lang="en-US" sz="1100" dirty="0"/>
@@ -14328,7 +14306,15 @@
                     <a:p>
                       <a:r>
                         <a:rPr lang="en-US" sz="1100" dirty="0"/>
-                        <a:t>App UID</a:t>
+                        <a:t>Product UID identifies which </a:t>
+                      </a:r>
+                      <a:r>
+                        <a:rPr lang="en-US" sz="1100" dirty="0" err="1"/>
+                        <a:t>Notehub</a:t>
+                      </a:r>
+                      <a:r>
+                        <a:rPr lang="en-US" sz="1100" dirty="0"/>
+                        <a:t> project to append a notefile</a:t>
                       </a:r>
                     </a:p>
                   </a:txBody>
@@ -14340,8 +14326,8 @@
                     <a:lstStyle/>
                     <a:p>
                       <a:r>
-                        <a:rPr lang="en-US" sz="900" dirty="0"/>
-                        <a:t>app:d8edc5cc-c7d7-48ef-aeda-7147b884111a</a:t>
+                        <a:rPr lang="en-US" sz="900" dirty="0" err="1"/>
+                        <a:t>com.mycompany.mygroup.myproject</a:t>
                       </a:r>
                       <a:endParaRPr lang="en-US" sz="900" dirty="0">
                         <a:latin typeface="Consolas" panose="020B0609020204030204" pitchFamily="49" charset="0"/>
@@ -14611,7 +14597,7 @@
               <a:rPr lang="en-US" sz="900" dirty="0" err="1">
                 <a:latin typeface="Consolas" panose="020B0609020204030204" pitchFamily="49" charset="0"/>
               </a:rPr>
-              <a:t>req?project</a:t>
+              <a:t>req?product</a:t>
             </a:r>
             <a:r>
               <a:rPr lang="en-US" sz="900" dirty="0">
@@ -14629,7 +14615,7 @@
               <a:rPr lang="en-US" sz="900" b="1" dirty="0" err="1">
                 <a:latin typeface="Consolas" panose="020B0609020204030204" pitchFamily="49" charset="0"/>
               </a:rPr>
-              <a:t>app_uid</a:t>
+              <a:t>product_uid</a:t>
             </a:r>
             <a:r>
               <a:rPr lang="en-US" sz="900" b="1" dirty="0">
@@ -14745,7 +14731,7 @@
         <p:spPr>
           <a:xfrm>
             <a:off x="5183188" y="4204252"/>
-            <a:ext cx="5475977" cy="369332"/>
+            <a:ext cx="5475977" cy="507831"/>
           </a:xfrm>
           <a:prstGeom prst="rect">
             <a:avLst/>
@@ -14781,7 +14767,7 @@
               <a:rPr lang="en-US" sz="900" dirty="0" err="1">
                 <a:latin typeface="Consolas" panose="020B0609020204030204" pitchFamily="49" charset="0"/>
               </a:rPr>
-              <a:t>req?project</a:t>
+              <a:t>req?product</a:t>
             </a:r>
             <a:r>
               <a:rPr lang="en-US" sz="900" dirty="0">
@@ -14799,7 +14785,7 @@
               <a:rPr lang="en-US" sz="900" b="1" dirty="0" err="1">
                 <a:latin typeface="Consolas" panose="020B0609020204030204" pitchFamily="49" charset="0"/>
               </a:rPr>
-              <a:t>app_uid</a:t>
+              <a:t>product_uid</a:t>
             </a:r>
             <a:r>
               <a:rPr lang="en-US" sz="900" b="1" dirty="0">
@@ -15339,6 +15325,11 @@
           </p:cNvGraphicFramePr>
           <p:nvPr>
             <p:ph idx="1"/>
+            <p:extLst>
+              <p:ext uri="{D42A27DB-BD31-4B8C-83A1-F6EECF244321}">
+                <p14:modId xmlns:p14="http://schemas.microsoft.com/office/powerpoint/2010/main" val="328304792"/>
+              </p:ext>
+            </p:extLst>
           </p:nvPr>
         </p:nvGraphicFramePr>
         <p:xfrm>
@@ -15359,14 +15350,14 @@
                     </a:ext>
                   </a:extLst>
                 </a:gridCol>
-                <a:gridCol w="2080592">
+                <a:gridCol w="2350856">
                   <a:extLst>
                     <a:ext uri="{9D8B030D-6E8A-4147-A177-3AD203B41FA5}">
                       <a16:colId xmlns:a16="http://schemas.microsoft.com/office/drawing/2014/main" val="1529368550"/>
                     </a:ext>
                   </a:extLst>
                 </a:gridCol>
-                <a:gridCol w="2971179">
+                <a:gridCol w="2700915">
                   <a:extLst>
                     <a:ext uri="{9D8B030D-6E8A-4147-A177-3AD203B41FA5}">
                       <a16:colId xmlns:a16="http://schemas.microsoft.com/office/drawing/2014/main" val="1662634098"/>
@@ -15429,7 +15420,7 @@
                       </a:r>
                       <a:r>
                         <a:rPr lang="en-US" sz="1100" dirty="0" err="1"/>
-                        <a:t>app_uid</a:t>
+                        <a:t>product_uid</a:t>
                       </a:r>
                       <a:r>
                         <a:rPr lang="en-US" sz="1100" dirty="0"/>
@@ -15446,7 +15437,15 @@
                     <a:p>
                       <a:r>
                         <a:rPr lang="en-US" sz="1100" dirty="0"/>
-                        <a:t>App UID</a:t>
+                        <a:t>Product UID identifies which </a:t>
+                      </a:r>
+                      <a:r>
+                        <a:rPr lang="en-US" sz="1100" dirty="0" err="1"/>
+                        <a:t>Notehub</a:t>
+                      </a:r>
+                      <a:r>
+                        <a:rPr lang="en-US" sz="1100" dirty="0"/>
+                        <a:t> project to append a notefile</a:t>
                       </a:r>
                     </a:p>
                   </a:txBody>
@@ -15458,8 +15457,8 @@
                     <a:lstStyle/>
                     <a:p>
                       <a:r>
-                        <a:rPr lang="en-US" sz="900" dirty="0"/>
-                        <a:t>app:d8edc5cc-c7d7-48ef-aeda-7147b884111a</a:t>
+                        <a:rPr lang="en-US" sz="900" dirty="0" err="1"/>
+                        <a:t>com.mycompany.mygroup.myproject</a:t>
                       </a:r>
                       <a:endParaRPr lang="en-US" sz="900" dirty="0">
                         <a:latin typeface="Consolas" panose="020B0609020204030204" pitchFamily="49" charset="0"/>
@@ -15693,7 +15692,7 @@
           <p:nvPr>
             <p:extLst>
               <p:ext uri="{D42A27DB-BD31-4B8C-83A1-F6EECF244321}">
-                <p14:modId xmlns:p14="http://schemas.microsoft.com/office/powerpoint/2010/main" val="2615509647"/>
+                <p14:modId xmlns:p14="http://schemas.microsoft.com/office/powerpoint/2010/main" val="4190079548"/>
               </p:ext>
             </p:extLst>
           </p:nvPr>
@@ -15732,7 +15731,7 @@
                     <a:p>
                       <a:r>
                         <a:rPr lang="en-US" sz="1100" dirty="0"/>
-                        <a:t>project</a:t>
+                        <a:t>product</a:t>
                       </a:r>
                       <a:endParaRPr lang="en-US" sz="1100" dirty="0">
                         <a:latin typeface="Consolas" panose="020B0609020204030204" pitchFamily="49" charset="0"/>
@@ -15752,7 +15751,7 @@
                       </a:r>
                       <a:r>
                         <a:rPr lang="en-US" sz="1100" dirty="0" err="1"/>
-                        <a:t>app_uid</a:t>
+                        <a:t>product_uid</a:t>
                       </a:r>
                       <a:r>
                         <a:rPr lang="en-US" sz="1100" dirty="0"/>
@@ -15884,46 +15883,6 @@
         </p:pic>
         <p:pic>
           <p:nvPicPr>
-            <p:cNvPr id="5" name="Picture 4">
-              <a:extLst>
-                <a:ext uri="{FF2B5EF4-FFF2-40B4-BE49-F238E27FC236}">
-                  <a16:creationId xmlns:a16="http://schemas.microsoft.com/office/drawing/2014/main" id="{021044F7-076E-46B0-BF4C-3E7C3DE1600B}"/>
-                </a:ext>
-              </a:extLst>
-            </p:cNvPr>
-            <p:cNvPicPr>
-              <a:picLocks noChangeAspect="1"/>
-            </p:cNvPicPr>
-            <p:nvPr/>
-          </p:nvPicPr>
-          <p:blipFill>
-            <a:blip r:embed="rId3"/>
-            <a:stretch>
-              <a:fillRect/>
-            </a:stretch>
-          </p:blipFill>
-          <p:spPr>
-            <a:xfrm>
-              <a:off x="5183188" y="4102382"/>
-              <a:ext cx="4686541" cy="1587582"/>
-            </a:xfrm>
-            <a:prstGeom prst="rect">
-              <a:avLst/>
-            </a:prstGeom>
-            <a:ln>
-              <a:noFill/>
-            </a:ln>
-            <a:effectLst>
-              <a:outerShdw blurRad="190500" algn="tl" rotWithShape="0">
-                <a:srgbClr val="000000">
-                  <a:alpha val="70000"/>
-                </a:srgbClr>
-              </a:outerShdw>
-            </a:effectLst>
-          </p:spPr>
-        </p:pic>
-        <p:pic>
-          <p:nvPicPr>
             <p:cNvPr id="17" name="Picture 16">
               <a:extLst>
                 <a:ext uri="{FF2B5EF4-FFF2-40B4-BE49-F238E27FC236}">
@@ -15937,7 +15896,7 @@
             <p:nvPr/>
           </p:nvPicPr>
           <p:blipFill rotWithShape="1">
-            <a:blip r:embed="rId4"/>
+            <a:blip r:embed="rId3"/>
             <a:srcRect t="9970" r="1588" b="26853"/>
             <a:stretch/>
           </p:blipFill>
@@ -16013,6 +15972,144 @@
       </p:sp>
       <p:sp>
         <p:nvSpPr>
+          <p:cNvPr id="23" name="Oval 22">
+            <a:extLst>
+              <a:ext uri="{FF2B5EF4-FFF2-40B4-BE49-F238E27FC236}">
+                <a16:creationId xmlns:a16="http://schemas.microsoft.com/office/drawing/2014/main" id="{7F058A7F-221F-430A-99D0-0B1CD4D10915}"/>
+              </a:ext>
+            </a:extLst>
+          </p:cNvPr>
+          <p:cNvSpPr/>
+          <p:nvPr/>
+        </p:nvSpPr>
+        <p:spPr>
+          <a:xfrm>
+            <a:off x="8697967" y="5594668"/>
+            <a:ext cx="274320" cy="274320"/>
+          </a:xfrm>
+          <a:prstGeom prst="ellipse">
+            <a:avLst/>
+          </a:prstGeom>
+        </p:spPr>
+        <p:style>
+          <a:lnRef idx="2">
+            <a:schemeClr val="accent6">
+              <a:shade val="50000"/>
+            </a:schemeClr>
+          </a:lnRef>
+          <a:fillRef idx="1">
+            <a:schemeClr val="accent6"/>
+          </a:fillRef>
+          <a:effectRef idx="0">
+            <a:schemeClr val="accent6"/>
+          </a:effectRef>
+          <a:fontRef idx="minor">
+            <a:schemeClr val="lt1"/>
+          </a:fontRef>
+        </p:style>
+        <p:txBody>
+          <a:bodyPr rtlCol="0" anchor="ctr"/>
+          <a:lstStyle/>
+          <a:p>
+            <a:pPr algn="ctr"/>
+            <a:r>
+              <a:rPr lang="en-US" dirty="0"/>
+              <a:t>4</a:t>
+            </a:r>
+          </a:p>
+        </p:txBody>
+      </p:sp>
+      <p:sp>
+        <p:nvSpPr>
+          <p:cNvPr id="24" name="Oval 23">
+            <a:extLst>
+              <a:ext uri="{FF2B5EF4-FFF2-40B4-BE49-F238E27FC236}">
+                <a16:creationId xmlns:a16="http://schemas.microsoft.com/office/drawing/2014/main" id="{B5652A44-2AD6-463F-A934-75233CFE1903}"/>
+              </a:ext>
+            </a:extLst>
+          </p:cNvPr>
+          <p:cNvSpPr/>
+          <p:nvPr/>
+        </p:nvSpPr>
+        <p:spPr>
+          <a:xfrm>
+            <a:off x="9764945" y="6092201"/>
+            <a:ext cx="274320" cy="274320"/>
+          </a:xfrm>
+          <a:prstGeom prst="ellipse">
+            <a:avLst/>
+          </a:prstGeom>
+        </p:spPr>
+        <p:style>
+          <a:lnRef idx="2">
+            <a:schemeClr val="accent6">
+              <a:shade val="50000"/>
+            </a:schemeClr>
+          </a:lnRef>
+          <a:fillRef idx="1">
+            <a:schemeClr val="accent6"/>
+          </a:fillRef>
+          <a:effectRef idx="0">
+            <a:schemeClr val="accent6"/>
+          </a:effectRef>
+          <a:fontRef idx="minor">
+            <a:schemeClr val="lt1"/>
+          </a:fontRef>
+        </p:style>
+        <p:txBody>
+          <a:bodyPr rtlCol="0" anchor="ctr"/>
+          <a:lstStyle/>
+          <a:p>
+            <a:pPr algn="ctr"/>
+            <a:r>
+              <a:rPr lang="en-US" dirty="0"/>
+              <a:t>5</a:t>
+            </a:r>
+          </a:p>
+        </p:txBody>
+      </p:sp>
+      <p:pic>
+        <p:nvPicPr>
+          <p:cNvPr id="3" name="Picture 2">
+            <a:extLst>
+              <a:ext uri="{FF2B5EF4-FFF2-40B4-BE49-F238E27FC236}">
+                <a16:creationId xmlns:a16="http://schemas.microsoft.com/office/drawing/2014/main" id="{795072B0-482D-473B-9E81-2BB1D450FCD6}"/>
+              </a:ext>
+            </a:extLst>
+          </p:cNvPr>
+          <p:cNvPicPr>
+            <a:picLocks noChangeAspect="1"/>
+          </p:cNvPicPr>
+          <p:nvPr/>
+        </p:nvPicPr>
+        <p:blipFill>
+          <a:blip r:embed="rId4"/>
+          <a:stretch>
+            <a:fillRect/>
+          </a:stretch>
+        </p:blipFill>
+        <p:spPr>
+          <a:xfrm>
+            <a:off x="5183188" y="3835684"/>
+            <a:ext cx="4578585" cy="1511378"/>
+          </a:xfrm>
+          <a:prstGeom prst="rect">
+            <a:avLst/>
+          </a:prstGeom>
+          <a:ln>
+            <a:noFill/>
+          </a:ln>
+          <a:effectLst>
+            <a:outerShdw blurRad="190500" algn="tl" rotWithShape="0">
+              <a:srgbClr val="000000">
+                <a:alpha val="70000"/>
+              </a:srgbClr>
+            </a:outerShdw>
+          </a:effectLst>
+        </p:spPr>
+      </p:pic>
+      <p:sp>
+        <p:nvSpPr>
           <p:cNvPr id="22" name="Oval 21">
             <a:extLst>
               <a:ext uri="{FF2B5EF4-FFF2-40B4-BE49-F238E27FC236}">
@@ -16056,104 +16153,6 @@
             <a:r>
               <a:rPr lang="en-US" dirty="0"/>
               <a:t>3</a:t>
-            </a:r>
-          </a:p>
-        </p:txBody>
-      </p:sp>
-      <p:sp>
-        <p:nvSpPr>
-          <p:cNvPr id="23" name="Oval 22">
-            <a:extLst>
-              <a:ext uri="{FF2B5EF4-FFF2-40B4-BE49-F238E27FC236}">
-                <a16:creationId xmlns:a16="http://schemas.microsoft.com/office/drawing/2014/main" id="{7F058A7F-221F-430A-99D0-0B1CD4D10915}"/>
-              </a:ext>
-            </a:extLst>
-          </p:cNvPr>
-          <p:cNvSpPr/>
-          <p:nvPr/>
-        </p:nvSpPr>
-        <p:spPr>
-          <a:xfrm>
-            <a:off x="8697967" y="5594668"/>
-            <a:ext cx="274320" cy="274320"/>
-          </a:xfrm>
-          <a:prstGeom prst="ellipse">
-            <a:avLst/>
-          </a:prstGeom>
-        </p:spPr>
-        <p:style>
-          <a:lnRef idx="2">
-            <a:schemeClr val="accent6">
-              <a:shade val="50000"/>
-            </a:schemeClr>
-          </a:lnRef>
-          <a:fillRef idx="1">
-            <a:schemeClr val="accent6"/>
-          </a:fillRef>
-          <a:effectRef idx="0">
-            <a:schemeClr val="accent6"/>
-          </a:effectRef>
-          <a:fontRef idx="minor">
-            <a:schemeClr val="lt1"/>
-          </a:fontRef>
-        </p:style>
-        <p:txBody>
-          <a:bodyPr rtlCol="0" anchor="ctr"/>
-          <a:lstStyle/>
-          <a:p>
-            <a:pPr algn="ctr"/>
-            <a:r>
-              <a:rPr lang="en-US" dirty="0"/>
-              <a:t>4</a:t>
-            </a:r>
-          </a:p>
-        </p:txBody>
-      </p:sp>
-      <p:sp>
-        <p:nvSpPr>
-          <p:cNvPr id="24" name="Oval 23">
-            <a:extLst>
-              <a:ext uri="{FF2B5EF4-FFF2-40B4-BE49-F238E27FC236}">
-                <a16:creationId xmlns:a16="http://schemas.microsoft.com/office/drawing/2014/main" id="{B5652A44-2AD6-463F-A934-75233CFE1903}"/>
-              </a:ext>
-            </a:extLst>
-          </p:cNvPr>
-          <p:cNvSpPr/>
-          <p:nvPr/>
-        </p:nvSpPr>
-        <p:spPr>
-          <a:xfrm>
-            <a:off x="9764945" y="6092201"/>
-            <a:ext cx="274320" cy="274320"/>
-          </a:xfrm>
-          <a:prstGeom prst="ellipse">
-            <a:avLst/>
-          </a:prstGeom>
-        </p:spPr>
-        <p:style>
-          <a:lnRef idx="2">
-            <a:schemeClr val="accent6">
-              <a:shade val="50000"/>
-            </a:schemeClr>
-          </a:lnRef>
-          <a:fillRef idx="1">
-            <a:schemeClr val="accent6"/>
-          </a:fillRef>
-          <a:effectRef idx="0">
-            <a:schemeClr val="accent6"/>
-          </a:effectRef>
-          <a:fontRef idx="minor">
-            <a:schemeClr val="lt1"/>
-          </a:fontRef>
-        </p:style>
-        <p:txBody>
-          <a:bodyPr rtlCol="0" anchor="ctr"/>
-          <a:lstStyle/>
-          <a:p>
-            <a:pPr algn="ctr"/>
-            <a:r>
-              <a:rPr lang="en-US" dirty="0"/>
-              <a:t>5</a:t>
             </a:r>
           </a:p>
         </p:txBody>
@@ -16307,7 +16306,7 @@
                     <a:lstStyle/>
                     <a:p>
                       <a:r>
-                        <a:rPr lang="en-US" sz="1400" b="0" cap="all" spc="150">
+                        <a:rPr lang="en-US" sz="1400" b="0" cap="all" spc="150" dirty="0">
                           <a:solidFill>
                             <a:schemeClr val="lt1"/>
                           </a:solidFill>
@@ -16548,7 +16547,7 @@
                     <a:lstStyle/>
                     <a:p>
                       <a:r>
-                        <a:rPr lang="en-US" sz="1200" cap="none" spc="0">
+                        <a:rPr lang="en-US" sz="1200" cap="none" spc="0" dirty="0">
                           <a:solidFill>
                             <a:schemeClr val="tx1"/>
                           </a:solidFill>
@@ -16558,7 +16557,7 @@
                     </a:p>
                     <a:p>
                       <a:r>
-                        <a:rPr lang="en-US" sz="1200" cap="none" spc="0">
+                        <a:rPr lang="en-US" sz="1200" cap="none" spc="0" dirty="0">
                           <a:solidFill>
                             <a:schemeClr val="tx1"/>
                           </a:solidFill>
@@ -16568,7 +16567,7 @@
                     </a:p>
                     <a:p>
                       <a:r>
-                        <a:rPr lang="en-US" sz="1200" cap="none" spc="0">
+                        <a:rPr lang="en-US" sz="1200" cap="none" spc="0" dirty="0">
                           <a:solidFill>
                             <a:schemeClr val="tx1"/>
                           </a:solidFill>
@@ -16578,7 +16577,7 @@
                     </a:p>
                     <a:p>
                       <a:r>
-                        <a:rPr lang="en-US" sz="1200" cap="none" spc="0">
+                        <a:rPr lang="en-US" sz="1200" cap="none" spc="0" dirty="0">
                           <a:solidFill>
                             <a:schemeClr val="tx1"/>
                           </a:solidFill>
@@ -16753,7 +16752,7 @@
                     <a:lstStyle/>
                     <a:p>
                       <a:r>
-                        <a:rPr lang="en-US" sz="1200" cap="none" spc="0">
+                        <a:rPr lang="en-US" sz="1200" cap="none" spc="0" dirty="0">
                           <a:solidFill>
                             <a:schemeClr val="tx1"/>
                           </a:solidFill>
@@ -16763,7 +16762,7 @@
                     </a:p>
                     <a:p>
                       <a:r>
-                        <a:rPr lang="en-US" sz="1200" cap="none" spc="0">
+                        <a:rPr lang="en-US" sz="1200" cap="none" spc="0" dirty="0">
                           <a:solidFill>
                             <a:schemeClr val="tx1"/>
                           </a:solidFill>
@@ -16773,7 +16772,7 @@
                     </a:p>
                     <a:p>
                       <a:r>
-                        <a:rPr lang="en-US" sz="1200" cap="none" spc="0">
+                        <a:rPr lang="en-US" sz="1200" cap="none" spc="0" dirty="0">
                           <a:solidFill>
                             <a:schemeClr val="tx1"/>
                           </a:solidFill>

</xml_diff>